<commit_message>
Ricequant research 40% done.
</commit_message>
<xml_diff>
--- a/Stellar_0.1/documents/public_quant_platforms_research.pptx
+++ b/Stellar_0.1/documents/public_quant_platforms_research.pptx
@@ -216,7 +216,7 @@
           <a:p>
             <a:fld id="{898613DB-8F97-1741-9118-0D4449739394}" type="datetimeFigureOut">
               <a:rPr kumimoji="1" lang="zh-CN" altLang="en-US" smtClean="0"/>
-              <a:t>16/9/21</a:t>
+              <a:t>16/9/22</a:t>
             </a:fld>
             <a:endParaRPr kumimoji="1" lang="zh-CN" altLang="en-US"/>
           </a:p>
@@ -2292,7 +2292,7 @@
           <a:p>
             <a:fld id="{3B59D8F7-997B-304D-A0DA-493074199D5A}" type="datetimeFigureOut">
               <a:rPr kumimoji="1" lang="zh-CN" altLang="en-US" smtClean="0"/>
-              <a:t>16/9/21</a:t>
+              <a:t>16/9/22</a:t>
             </a:fld>
             <a:endParaRPr kumimoji="1" lang="zh-CN" altLang="en-US"/>
           </a:p>
@@ -2460,7 +2460,7 @@
           <a:p>
             <a:fld id="{3B59D8F7-997B-304D-A0DA-493074199D5A}" type="datetimeFigureOut">
               <a:rPr kumimoji="1" lang="zh-CN" altLang="en-US" smtClean="0"/>
-              <a:t>16/9/21</a:t>
+              <a:t>16/9/22</a:t>
             </a:fld>
             <a:endParaRPr kumimoji="1" lang="zh-CN" altLang="en-US"/>
           </a:p>
@@ -2638,7 +2638,7 @@
           <a:p>
             <a:fld id="{3B59D8F7-997B-304D-A0DA-493074199D5A}" type="datetimeFigureOut">
               <a:rPr kumimoji="1" lang="zh-CN" altLang="en-US" smtClean="0"/>
-              <a:t>16/9/21</a:t>
+              <a:t>16/9/22</a:t>
             </a:fld>
             <a:endParaRPr kumimoji="1" lang="zh-CN" altLang="en-US"/>
           </a:p>
@@ -2806,7 +2806,7 @@
           <a:p>
             <a:fld id="{3B59D8F7-997B-304D-A0DA-493074199D5A}" type="datetimeFigureOut">
               <a:rPr kumimoji="1" lang="zh-CN" altLang="en-US" smtClean="0"/>
-              <a:t>16/9/21</a:t>
+              <a:t>16/9/22</a:t>
             </a:fld>
             <a:endParaRPr kumimoji="1" lang="zh-CN" altLang="en-US"/>
           </a:p>
@@ -3051,7 +3051,7 @@
           <a:p>
             <a:fld id="{3B59D8F7-997B-304D-A0DA-493074199D5A}" type="datetimeFigureOut">
               <a:rPr kumimoji="1" lang="zh-CN" altLang="en-US" smtClean="0"/>
-              <a:t>16/9/21</a:t>
+              <a:t>16/9/22</a:t>
             </a:fld>
             <a:endParaRPr kumimoji="1" lang="zh-CN" altLang="en-US"/>
           </a:p>
@@ -3280,7 +3280,7 @@
           <a:p>
             <a:fld id="{3B59D8F7-997B-304D-A0DA-493074199D5A}" type="datetimeFigureOut">
               <a:rPr kumimoji="1" lang="zh-CN" altLang="en-US" smtClean="0"/>
-              <a:t>16/9/21</a:t>
+              <a:t>16/9/22</a:t>
             </a:fld>
             <a:endParaRPr kumimoji="1" lang="zh-CN" altLang="en-US"/>
           </a:p>
@@ -3644,7 +3644,7 @@
           <a:p>
             <a:fld id="{3B59D8F7-997B-304D-A0DA-493074199D5A}" type="datetimeFigureOut">
               <a:rPr kumimoji="1" lang="zh-CN" altLang="en-US" smtClean="0"/>
-              <a:t>16/9/21</a:t>
+              <a:t>16/9/22</a:t>
             </a:fld>
             <a:endParaRPr kumimoji="1" lang="zh-CN" altLang="en-US"/>
           </a:p>
@@ -3761,7 +3761,7 @@
           <a:p>
             <a:fld id="{3B59D8F7-997B-304D-A0DA-493074199D5A}" type="datetimeFigureOut">
               <a:rPr kumimoji="1" lang="zh-CN" altLang="en-US" smtClean="0"/>
-              <a:t>16/9/21</a:t>
+              <a:t>16/9/22</a:t>
             </a:fld>
             <a:endParaRPr kumimoji="1" lang="zh-CN" altLang="en-US"/>
           </a:p>
@@ -3856,7 +3856,7 @@
           <a:p>
             <a:fld id="{3B59D8F7-997B-304D-A0DA-493074199D5A}" type="datetimeFigureOut">
               <a:rPr kumimoji="1" lang="zh-CN" altLang="en-US" smtClean="0"/>
-              <a:t>16/9/21</a:t>
+              <a:t>16/9/22</a:t>
             </a:fld>
             <a:endParaRPr kumimoji="1" lang="zh-CN" altLang="en-US"/>
           </a:p>
@@ -4131,7 +4131,7 @@
           <a:p>
             <a:fld id="{3B59D8F7-997B-304D-A0DA-493074199D5A}" type="datetimeFigureOut">
               <a:rPr kumimoji="1" lang="zh-CN" altLang="en-US" smtClean="0"/>
-              <a:t>16/9/21</a:t>
+              <a:t>16/9/22</a:t>
             </a:fld>
             <a:endParaRPr kumimoji="1" lang="zh-CN" altLang="en-US"/>
           </a:p>
@@ -4383,7 +4383,7 @@
           <a:p>
             <a:fld id="{3B59D8F7-997B-304D-A0DA-493074199D5A}" type="datetimeFigureOut">
               <a:rPr kumimoji="1" lang="zh-CN" altLang="en-US" smtClean="0"/>
-              <a:t>16/9/21</a:t>
+              <a:t>16/9/22</a:t>
             </a:fld>
             <a:endParaRPr kumimoji="1" lang="zh-CN" altLang="en-US"/>
           </a:p>
@@ -4594,7 +4594,7 @@
           <a:p>
             <a:fld id="{3B59D8F7-997B-304D-A0DA-493074199D5A}" type="datetimeFigureOut">
               <a:rPr kumimoji="1" lang="zh-CN" altLang="en-US" smtClean="0"/>
-              <a:t>16/9/21</a:t>
+              <a:t>16/9/22</a:t>
             </a:fld>
             <a:endParaRPr kumimoji="1" lang="zh-CN" altLang="en-US"/>
           </a:p>
@@ -9399,21 +9399,36 @@
               <a:buChar char="•"/>
             </a:pPr>
             <a:r>
-              <a:rPr lang="zh-CN" altLang="en-US" sz="2400" dirty="0" smtClean="0">
-                <a:solidFill>
-                  <a:srgbClr val="EAAF07">
+              <a:rPr lang="it-IT" altLang="zh-CN" sz="2400" dirty="0" smtClean="0">
+                <a:solidFill>
+                  <a:srgbClr val="FFC000">
                     <a:alpha val="99000"/>
                   </a:srgbClr>
                 </a:solidFill>
                 <a:latin typeface="Yuanti SC" charset="-122"/>
                 <a:ea typeface="Yuanti SC" charset="-122"/>
                 <a:cs typeface="Yuanti SC" charset="-122"/>
+                <a:hlinkClick r:id="rId4" action="ppaction://hlinkpres?slideindex=1&amp;slidetitle="/>
               </a:rPr>
-              <a:t>研究报告</a:t>
+              <a:t>Ricequant</a:t>
+            </a:r>
+            <a:r>
+              <a:rPr lang="zh-CN" altLang="it-IT" sz="2400" dirty="0" smtClean="0">
+                <a:solidFill>
+                  <a:srgbClr val="FFC000">
+                    <a:alpha val="99000"/>
+                  </a:srgbClr>
+                </a:solidFill>
+                <a:latin typeface="Yuanti SC" charset="-122"/>
+                <a:ea typeface="Yuanti SC" charset="-122"/>
+                <a:cs typeface="Yuanti SC" charset="-122"/>
+                <a:hlinkClick r:id="rId4" action="ppaction://hlinkpres?slideindex=1&amp;slidetitle="/>
+              </a:rPr>
+              <a:t>研究</a:t>
             </a:r>
             <a:endParaRPr lang="zh-CN" altLang="en-US" sz="2400" dirty="0" smtClean="0">
               <a:solidFill>
-                <a:srgbClr val="EAAF07">
+                <a:srgbClr val="FFC000">
                   <a:alpha val="99000"/>
                 </a:srgbClr>
               </a:solidFill>
@@ -17372,16 +17387,6 @@
               </a:rPr>
               <a:t>研究报告</a:t>
             </a:r>
-            <a:endParaRPr lang="zh-CN" altLang="en-US" sz="2400" dirty="0" smtClean="0">
-              <a:solidFill>
-                <a:srgbClr val="EAAF07">
-                  <a:alpha val="99000"/>
-                </a:srgbClr>
-              </a:solidFill>
-              <a:latin typeface="Yuanti SC" charset="-122"/>
-              <a:ea typeface="Yuanti SC" charset="-122"/>
-              <a:cs typeface="Yuanti SC" charset="-122"/>
-            </a:endParaRPr>
           </a:p>
         </p:txBody>
       </p:sp>
@@ -22983,16 +22988,6 @@
               </a:rPr>
               <a:t>报告</a:t>
             </a:r>
-            <a:endParaRPr lang="zh-CN" altLang="en-US" sz="2400" dirty="0" smtClean="0">
-              <a:solidFill>
-                <a:srgbClr val="EAAF07">
-                  <a:alpha val="99000"/>
-                </a:srgbClr>
-              </a:solidFill>
-              <a:latin typeface="Yuanti SC" charset="-122"/>
-              <a:ea typeface="Yuanti SC" charset="-122"/>
-              <a:cs typeface="Yuanti SC" charset="-122"/>
-            </a:endParaRPr>
           </a:p>
         </p:txBody>
       </p:sp>
@@ -27149,21 +27144,21 @@
                 <a:gridCol w="1853596">
                   <a:extLst>
                     <a:ext uri="{9D8B030D-6E8A-4147-A177-3AD203B41FA5}">
-                      <a16:colId xmlns="" xmlns:a16="http://schemas.microsoft.com/office/drawing/2014/main" val="20000"/>
+                      <a16:colId xmlns:a16="http://schemas.microsoft.com/office/drawing/2014/main" xmlns="" val="20000"/>
                     </a:ext>
                   </a:extLst>
                 </a:gridCol>
                 <a:gridCol w="2561204">
                   <a:extLst>
                     <a:ext uri="{9D8B030D-6E8A-4147-A177-3AD203B41FA5}">
-                      <a16:colId xmlns="" xmlns:a16="http://schemas.microsoft.com/office/drawing/2014/main" val="20001"/>
+                      <a16:colId xmlns:a16="http://schemas.microsoft.com/office/drawing/2014/main" xmlns="" val="20001"/>
                     </a:ext>
                   </a:extLst>
                 </a:gridCol>
                 <a:gridCol w="6651172">
                   <a:extLst>
                     <a:ext uri="{9D8B030D-6E8A-4147-A177-3AD203B41FA5}">
-                      <a16:colId xmlns="" xmlns:a16="http://schemas.microsoft.com/office/drawing/2014/main" val="20002"/>
+                      <a16:colId xmlns:a16="http://schemas.microsoft.com/office/drawing/2014/main" xmlns="" val="20002"/>
                     </a:ext>
                   </a:extLst>
                 </a:gridCol>
@@ -27508,7 +27503,7 @@
                 </a:tc>
                 <a:extLst>
                   <a:ext uri="{0D108BD9-81ED-4DB2-BD59-A6C34878D82A}">
-                    <a16:rowId xmlns="" xmlns:a16="http://schemas.microsoft.com/office/drawing/2014/main" val="10000"/>
+                    <a16:rowId xmlns:a16="http://schemas.microsoft.com/office/drawing/2014/main" xmlns="" val="10000"/>
                   </a:ext>
                 </a:extLst>
               </a:tr>
@@ -27807,7 +27802,7 @@
                 </a:tc>
                 <a:extLst>
                   <a:ext uri="{0D108BD9-81ED-4DB2-BD59-A6C34878D82A}">
-                    <a16:rowId xmlns="" xmlns:a16="http://schemas.microsoft.com/office/drawing/2014/main" val="10001"/>
+                    <a16:rowId xmlns:a16="http://schemas.microsoft.com/office/drawing/2014/main" xmlns="" val="10001"/>
                   </a:ext>
                 </a:extLst>
               </a:tr>
@@ -28144,7 +28139,7 @@
                 </a:tc>
                 <a:extLst>
                   <a:ext uri="{0D108BD9-81ED-4DB2-BD59-A6C34878D82A}">
-                    <a16:rowId xmlns="" xmlns:a16="http://schemas.microsoft.com/office/drawing/2014/main" val="10002"/>
+                    <a16:rowId xmlns:a16="http://schemas.microsoft.com/office/drawing/2014/main" xmlns="" val="10002"/>
                   </a:ext>
                 </a:extLst>
               </a:tr>
@@ -28481,7 +28476,7 @@
                 </a:tc>
                 <a:extLst>
                   <a:ext uri="{0D108BD9-81ED-4DB2-BD59-A6C34878D82A}">
-                    <a16:rowId xmlns="" xmlns:a16="http://schemas.microsoft.com/office/drawing/2014/main" val="10003"/>
+                    <a16:rowId xmlns:a16="http://schemas.microsoft.com/office/drawing/2014/main" xmlns="" val="10003"/>
                   </a:ext>
                 </a:extLst>
               </a:tr>
@@ -28818,7 +28813,7 @@
                 </a:tc>
                 <a:extLst>
                   <a:ext uri="{0D108BD9-81ED-4DB2-BD59-A6C34878D82A}">
-                    <a16:rowId xmlns="" xmlns:a16="http://schemas.microsoft.com/office/drawing/2014/main" val="10004"/>
+                    <a16:rowId xmlns:a16="http://schemas.microsoft.com/office/drawing/2014/main" xmlns="" val="10004"/>
                   </a:ext>
                 </a:extLst>
               </a:tr>

</xml_diff>